<commit_message>
Add format to protocol lines per meeting discussion
But keep in mind that the value used in a concrete API may or may
not appear literally

Signed-off-by: Dave Thaler <dthaler@ntdev.microsoft.com>
</commit_message>
<xml_diff>
--- a/AttestationAbstractAPIs.pptx
+++ b/AttestationAbstractAPIs.pptx
@@ -206,7 +206,7 @@
           <a:p>
             <a:fld id="{ACC961D2-8CDC-455F-9C37-02FD50092704}" type="datetimeFigureOut">
               <a:rPr lang="en-US" smtClean="0"/>
-              <a:t>6/2/2020</a:t>
+              <a:t>6/3/2020</a:t>
             </a:fld>
             <a:endParaRPr lang="en-US"/>
           </a:p>
@@ -605,7 +605,7 @@
           <a:p>
             <a:fld id="{B82FFB17-627A-4128-AE54-A7850EBC3994}" type="datetime1">
               <a:rPr lang="en-US" smtClean="0"/>
-              <a:t>6/2/2020</a:t>
+              <a:t>6/3/2020</a:t>
             </a:fld>
             <a:endParaRPr lang="en-US"/>
           </a:p>
@@ -775,7 +775,7 @@
           <a:p>
             <a:fld id="{190E103F-9FC8-41FC-B4DC-FDC3C0B5FEFB}" type="datetime1">
               <a:rPr lang="en-US" smtClean="0"/>
-              <a:t>6/2/2020</a:t>
+              <a:t>6/3/2020</a:t>
             </a:fld>
             <a:endParaRPr lang="en-US"/>
           </a:p>
@@ -955,7 +955,7 @@
           <a:p>
             <a:fld id="{1BCA4AE9-0917-45EB-9C4C-54D072E6ACA2}" type="datetime1">
               <a:rPr lang="en-US" smtClean="0"/>
-              <a:t>6/2/2020</a:t>
+              <a:t>6/3/2020</a:t>
             </a:fld>
             <a:endParaRPr lang="en-US"/>
           </a:p>
@@ -1125,7 +1125,7 @@
           <a:p>
             <a:fld id="{18C32CBB-861B-4C65-938D-93F40C6BBB01}" type="datetime1">
               <a:rPr lang="en-US" smtClean="0"/>
-              <a:t>6/2/2020</a:t>
+              <a:t>6/3/2020</a:t>
             </a:fld>
             <a:endParaRPr lang="en-US"/>
           </a:p>
@@ -1371,7 +1371,7 @@
           <a:p>
             <a:fld id="{8360C038-5928-4C76-8196-AA450C122E73}" type="datetime1">
               <a:rPr lang="en-US" smtClean="0"/>
-              <a:t>6/2/2020</a:t>
+              <a:t>6/3/2020</a:t>
             </a:fld>
             <a:endParaRPr lang="en-US"/>
           </a:p>
@@ -1603,7 +1603,7 @@
           <a:p>
             <a:fld id="{CCE043F4-EBD8-4706-940A-7132A8D16CA6}" type="datetime1">
               <a:rPr lang="en-US" smtClean="0"/>
-              <a:t>6/2/2020</a:t>
+              <a:t>6/3/2020</a:t>
             </a:fld>
             <a:endParaRPr lang="en-US"/>
           </a:p>
@@ -1970,7 +1970,7 @@
           <a:p>
             <a:fld id="{CD5FB2FC-48F9-49FD-B6FC-7C13ADB720AE}" type="datetime1">
               <a:rPr lang="en-US" smtClean="0"/>
-              <a:t>6/2/2020</a:t>
+              <a:t>6/3/2020</a:t>
             </a:fld>
             <a:endParaRPr lang="en-US"/>
           </a:p>
@@ -2088,7 +2088,7 @@
           <a:p>
             <a:fld id="{0C054607-4F59-4755-BDE3-4D7478ACF55B}" type="datetime1">
               <a:rPr lang="en-US" smtClean="0"/>
-              <a:t>6/2/2020</a:t>
+              <a:t>6/3/2020</a:t>
             </a:fld>
             <a:endParaRPr lang="en-US"/>
           </a:p>
@@ -2183,7 +2183,7 @@
           <a:p>
             <a:fld id="{5693258B-4CE3-414C-8C64-0080AA0904E9}" type="datetime1">
               <a:rPr lang="en-US" smtClean="0"/>
-              <a:t>6/2/2020</a:t>
+              <a:t>6/3/2020</a:t>
             </a:fld>
             <a:endParaRPr lang="en-US"/>
           </a:p>
@@ -2460,7 +2460,7 @@
           <a:p>
             <a:fld id="{A0F4C86D-A811-4132-9F58-20C598F044CF}" type="datetime1">
               <a:rPr lang="en-US" smtClean="0"/>
-              <a:t>6/2/2020</a:t>
+              <a:t>6/3/2020</a:t>
             </a:fld>
             <a:endParaRPr lang="en-US"/>
           </a:p>
@@ -2713,7 +2713,7 @@
           <a:p>
             <a:fld id="{E9CA48D3-5125-43D1-A267-F2F9A785565E}" type="datetime1">
               <a:rPr lang="en-US" smtClean="0"/>
-              <a:t>6/2/2020</a:t>
+              <a:t>6/3/2020</a:t>
             </a:fld>
             <a:endParaRPr lang="en-US"/>
           </a:p>
@@ -2926,7 +2926,7 @@
           <a:p>
             <a:fld id="{929CFA6F-4683-4976-BCFF-EA11CD940F14}" type="datetime1">
               <a:rPr lang="en-US" smtClean="0"/>
-              <a:t>6/2/2020</a:t>
+              <a:t>6/3/2020</a:t>
             </a:fld>
             <a:endParaRPr lang="en-US"/>
           </a:p>
@@ -3349,11 +3349,7 @@
           <a:p>
             <a:r>
               <a:rPr lang="en-US" dirty="0" smtClean="0"/>
-              <a:t>Attestation </a:t>
-            </a:r>
-            <a:r>
-              <a:rPr lang="en-US" dirty="0" smtClean="0"/>
-              <a:t>API Requirements</a:t>
+              <a:t>Attestation API Requirements</a:t>
             </a:r>
             <a:endParaRPr lang="en-US" dirty="0"/>
           </a:p>
@@ -3769,8 +3765,8 @@
         </p:nvSpPr>
         <p:spPr>
           <a:xfrm>
-            <a:off x="5766264" y="5228796"/>
-            <a:ext cx="808426" cy="369332"/>
+            <a:off x="5066616" y="5227348"/>
+            <a:ext cx="2217210" cy="369332"/>
           </a:xfrm>
           <a:prstGeom prst="rect">
             <a:avLst/>
@@ -3785,7 +3781,11 @@
           <a:p>
             <a:r>
               <a:rPr lang="en-US" dirty="0" smtClean="0"/>
-              <a:t>results</a:t>
+              <a:t>results, </a:t>
+            </a:r>
+            <a:r>
+              <a:rPr lang="en-US" dirty="0" err="1" smtClean="0"/>
+              <a:t>resultsFormat</a:t>
             </a:r>
             <a:endParaRPr lang="en-US" dirty="0"/>
           </a:p>
@@ -3825,36 +3825,6 @@
           </a:fontRef>
         </p:style>
       </p:cxnSp>
-      <p:sp>
-        <p:nvSpPr>
-          <p:cNvPr id="27" name="TextBox 26"/>
-          <p:cNvSpPr txBox="1"/>
-          <p:nvPr/>
-        </p:nvSpPr>
-        <p:spPr>
-          <a:xfrm>
-            <a:off x="2203938" y="2037222"/>
-            <a:ext cx="1028295" cy="369332"/>
-          </a:xfrm>
-          <a:prstGeom prst="rect">
-            <a:avLst/>
-          </a:prstGeom>
-          <a:noFill/>
-        </p:spPr>
-        <p:txBody>
-          <a:bodyPr wrap="none" rtlCol="0">
-            <a:spAutoFit/>
-          </a:bodyPr>
-          <a:lstStyle/>
-          <a:p>
-            <a:r>
-              <a:rPr lang="en-US" dirty="0" smtClean="0"/>
-              <a:t>evidence</a:t>
-            </a:r>
-            <a:endParaRPr lang="en-US" dirty="0"/>
-          </a:p>
-        </p:txBody>
-      </p:sp>
       <p:sp>
         <p:nvSpPr>
           <p:cNvPr id="28" name="Rectangle 27"/>
@@ -4069,6 +4039,44 @@
               <a:t>10</a:t>
             </a:fld>
             <a:endParaRPr lang="en-US"/>
+          </a:p>
+        </p:txBody>
+      </p:sp>
+      <p:sp>
+        <p:nvSpPr>
+          <p:cNvPr id="18" name="TextBox 17"/>
+          <p:cNvSpPr txBox="1"/>
+          <p:nvPr/>
+        </p:nvSpPr>
+        <p:spPr>
+          <a:xfrm>
+            <a:off x="1356670" y="2013542"/>
+            <a:ext cx="2656946" cy="369332"/>
+          </a:xfrm>
+          <a:prstGeom prst="rect">
+            <a:avLst/>
+          </a:prstGeom>
+          <a:noFill/>
+        </p:spPr>
+        <p:txBody>
+          <a:bodyPr wrap="none" rtlCol="0">
+            <a:spAutoFit/>
+          </a:bodyPr>
+          <a:lstStyle/>
+          <a:p>
+            <a:r>
+              <a:rPr lang="en-US" dirty="0"/>
+              <a:t>e</a:t>
+            </a:r>
+            <a:r>
+              <a:rPr lang="en-US" dirty="0" smtClean="0"/>
+              <a:t>vidence, </a:t>
+            </a:r>
+            <a:r>
+              <a:rPr lang="en-US" dirty="0" err="1" smtClean="0"/>
+              <a:t>evidenceFormat</a:t>
+            </a:r>
+            <a:endParaRPr lang="en-US" dirty="0"/>
           </a:p>
         </p:txBody>
       </p:sp>
@@ -7722,8 +7730,8 @@
         </p:nvSpPr>
         <p:spPr>
           <a:xfrm>
-            <a:off x="2203938" y="3322681"/>
-            <a:ext cx="1028295" cy="369332"/>
+            <a:off x="1526243" y="3327056"/>
+            <a:ext cx="2656946" cy="369332"/>
           </a:xfrm>
           <a:prstGeom prst="rect">
             <a:avLst/>
@@ -7737,8 +7745,16 @@
           <a:lstStyle/>
           <a:p>
             <a:r>
-              <a:rPr lang="en-US" dirty="0" smtClean="0"/>
-              <a:t>evidence</a:t>
+              <a:rPr lang="en-US" dirty="0"/>
+              <a:t>e</a:t>
+            </a:r>
+            <a:r>
+              <a:rPr lang="en-US" dirty="0" smtClean="0"/>
+              <a:t>vidence, </a:t>
+            </a:r>
+            <a:r>
+              <a:rPr lang="en-US" dirty="0" err="1" smtClean="0"/>
+              <a:t>evidenceFormat</a:t>
             </a:r>
             <a:endParaRPr lang="en-US" dirty="0"/>
           </a:p>
@@ -8330,8 +8346,8 @@
         </p:nvSpPr>
         <p:spPr>
           <a:xfrm>
-            <a:off x="2203938" y="3322681"/>
-            <a:ext cx="1028295" cy="369332"/>
+            <a:off x="1545016" y="3272100"/>
+            <a:ext cx="2656946" cy="369332"/>
           </a:xfrm>
           <a:prstGeom prst="rect">
             <a:avLst/>
@@ -8345,8 +8361,16 @@
           <a:lstStyle/>
           <a:p>
             <a:r>
-              <a:rPr lang="en-US" dirty="0" smtClean="0"/>
-              <a:t>evidence</a:t>
+              <a:rPr lang="en-US" dirty="0"/>
+              <a:t>e</a:t>
+            </a:r>
+            <a:r>
+              <a:rPr lang="en-US" dirty="0" smtClean="0"/>
+              <a:t>vidence, </a:t>
+            </a:r>
+            <a:r>
+              <a:rPr lang="en-US" dirty="0" err="1" smtClean="0"/>
+              <a:t>evidenceFormat</a:t>
             </a:r>
             <a:endParaRPr lang="en-US" dirty="0"/>
           </a:p>
@@ -8761,8 +8785,8 @@
         </p:nvSpPr>
         <p:spPr>
           <a:xfrm>
-            <a:off x="5766264" y="4990260"/>
-            <a:ext cx="808426" cy="369332"/>
+            <a:off x="5032741" y="4988812"/>
+            <a:ext cx="2286010" cy="369332"/>
           </a:xfrm>
           <a:prstGeom prst="rect">
             <a:avLst/>
@@ -8775,13 +8799,29 @@
           </a:bodyPr>
           <a:lstStyle/>
           <a:p>
+            <a:r>
+              <a:rPr lang="en-US" dirty="0">
+                <a:solidFill>
+                  <a:srgbClr val="7030A0"/>
+                </a:solidFill>
+              </a:rPr>
+              <a:t>r</a:t>
+            </a:r>
             <a:r>
               <a:rPr lang="en-US" dirty="0" smtClean="0">
                 <a:solidFill>
                   <a:srgbClr val="7030A0"/>
                 </a:solidFill>
               </a:rPr>
-              <a:t>results</a:t>
+              <a:t>esults, </a:t>
+            </a:r>
+            <a:r>
+              <a:rPr lang="en-US" dirty="0" err="1" smtClean="0">
+                <a:solidFill>
+                  <a:srgbClr val="7030A0"/>
+                </a:solidFill>
+              </a:rPr>
+              <a:t>resultsFormat</a:t>
             </a:r>
             <a:endParaRPr lang="en-US" dirty="0">
               <a:solidFill>

</xml_diff>